<commit_message>
update phy com ecol slides
</commit_message>
<xml_diff>
--- a/Phylogenetic_Community_Ecology/phylo_comm_ecol.pptx
+++ b/Phylogenetic_Community_Ecology/phylo_comm_ecol.pptx
@@ -244,7 +244,7 @@
           <a:p>
             <a:fld id="{54AD94B8-B778-974A-A752-91155AE2320A}" type="datetimeFigureOut">
               <a:rPr lang="en-US" smtClean="0"/>
-              <a:t>6/14/24</a:t>
+              <a:t>6/16/24</a:t>
             </a:fld>
             <a:endParaRPr lang="en-US"/>
           </a:p>
@@ -677,7 +677,7 @@
           </a:ln>
           <a:extLst>
             <a:ext uri="{FAA26D3D-D897-4be2-8F04-BA451C77F1D7}">
-              <ma14:placeholderFlag xmlns="" xmlns:ma14="http://schemas.microsoft.com/office/mac/drawingml/2011/main" val="1"/>
+              <ma14:placeholderFlag xmlns:ma14="http://schemas.microsoft.com/office/mac/drawingml/2011/main" xmlns="" val="1"/>
             </a:ext>
           </a:extLst>
         </p:spPr>
@@ -1923,7 +1923,7 @@
           </a:ln>
           <a:extLst>
             <a:ext uri="{FAA26D3D-D897-4be2-8F04-BA451C77F1D7}">
-              <ma14:placeholderFlag xmlns="" xmlns:ma14="http://schemas.microsoft.com/office/mac/drawingml/2011/main" val="1"/>
+              <ma14:placeholderFlag xmlns:ma14="http://schemas.microsoft.com/office/mac/drawingml/2011/main" xmlns="" val="1"/>
             </a:ext>
           </a:extLst>
         </p:spPr>
@@ -2126,7 +2126,7 @@
           <a:p>
             <a:fld id="{17CBCCC2-CF44-7446-879C-0DCCB74FA724}" type="datetimeFigureOut">
               <a:rPr lang="en-US" smtClean="0"/>
-              <a:t>6/14/24</a:t>
+              <a:t>6/16/24</a:t>
             </a:fld>
             <a:endParaRPr lang="en-US"/>
           </a:p>
@@ -2324,7 +2324,7 @@
           <a:p>
             <a:fld id="{17CBCCC2-CF44-7446-879C-0DCCB74FA724}" type="datetimeFigureOut">
               <a:rPr lang="en-US" smtClean="0"/>
-              <a:t>6/14/24</a:t>
+              <a:t>6/16/24</a:t>
             </a:fld>
             <a:endParaRPr lang="en-US"/>
           </a:p>
@@ -2532,7 +2532,7 @@
           <a:p>
             <a:fld id="{17CBCCC2-CF44-7446-879C-0DCCB74FA724}" type="datetimeFigureOut">
               <a:rPr lang="en-US" smtClean="0"/>
-              <a:t>6/14/24</a:t>
+              <a:t>6/16/24</a:t>
             </a:fld>
             <a:endParaRPr lang="en-US"/>
           </a:p>
@@ -2730,7 +2730,7 @@
           <a:p>
             <a:fld id="{17CBCCC2-CF44-7446-879C-0DCCB74FA724}" type="datetimeFigureOut">
               <a:rPr lang="en-US" smtClean="0"/>
-              <a:t>6/14/24</a:t>
+              <a:t>6/16/24</a:t>
             </a:fld>
             <a:endParaRPr lang="en-US"/>
           </a:p>
@@ -3005,7 +3005,7 @@
           <a:p>
             <a:fld id="{17CBCCC2-CF44-7446-879C-0DCCB74FA724}" type="datetimeFigureOut">
               <a:rPr lang="en-US" smtClean="0"/>
-              <a:t>6/14/24</a:t>
+              <a:t>6/16/24</a:t>
             </a:fld>
             <a:endParaRPr lang="en-US"/>
           </a:p>
@@ -3270,7 +3270,7 @@
           <a:p>
             <a:fld id="{17CBCCC2-CF44-7446-879C-0DCCB74FA724}" type="datetimeFigureOut">
               <a:rPr lang="en-US" smtClean="0"/>
-              <a:t>6/14/24</a:t>
+              <a:t>6/16/24</a:t>
             </a:fld>
             <a:endParaRPr lang="en-US"/>
           </a:p>
@@ -3682,7 +3682,7 @@
           <a:p>
             <a:fld id="{17CBCCC2-CF44-7446-879C-0DCCB74FA724}" type="datetimeFigureOut">
               <a:rPr lang="en-US" smtClean="0"/>
-              <a:t>6/14/24</a:t>
+              <a:t>6/16/24</a:t>
             </a:fld>
             <a:endParaRPr lang="en-US"/>
           </a:p>
@@ -3823,7 +3823,7 @@
           <a:p>
             <a:fld id="{17CBCCC2-CF44-7446-879C-0DCCB74FA724}" type="datetimeFigureOut">
               <a:rPr lang="en-US" smtClean="0"/>
-              <a:t>6/14/24</a:t>
+              <a:t>6/16/24</a:t>
             </a:fld>
             <a:endParaRPr lang="en-US"/>
           </a:p>
@@ -3936,7 +3936,7 @@
           <a:p>
             <a:fld id="{17CBCCC2-CF44-7446-879C-0DCCB74FA724}" type="datetimeFigureOut">
               <a:rPr lang="en-US" smtClean="0"/>
-              <a:t>6/14/24</a:t>
+              <a:t>6/16/24</a:t>
             </a:fld>
             <a:endParaRPr lang="en-US"/>
           </a:p>
@@ -4247,7 +4247,7 @@
           <a:p>
             <a:fld id="{17CBCCC2-CF44-7446-879C-0DCCB74FA724}" type="datetimeFigureOut">
               <a:rPr lang="en-US" smtClean="0"/>
-              <a:t>6/14/24</a:t>
+              <a:t>6/16/24</a:t>
             </a:fld>
             <a:endParaRPr lang="en-US"/>
           </a:p>
@@ -4535,7 +4535,7 @@
           <a:p>
             <a:fld id="{17CBCCC2-CF44-7446-879C-0DCCB74FA724}" type="datetimeFigureOut">
               <a:rPr lang="en-US" smtClean="0"/>
-              <a:t>6/14/24</a:t>
+              <a:t>6/16/24</a:t>
             </a:fld>
             <a:endParaRPr lang="en-US"/>
           </a:p>
@@ -4781,7 +4781,7 @@
           <a:p>
             <a:fld id="{17CBCCC2-CF44-7446-879C-0DCCB74FA724}" type="datetimeFigureOut">
               <a:rPr lang="en-US" smtClean="0"/>
-              <a:t>6/14/24</a:t>
+              <a:t>6/16/24</a:t>
             </a:fld>
             <a:endParaRPr lang="en-US"/>
           </a:p>
@@ -5694,14 +5694,14 @@
           </a:ln>
           <a:extLst>
             <a:ext uri="{909E8E84-426E-40dd-AFC4-6F175D3DCCD1}">
-              <a14:hiddenFill xmlns:a14="http://schemas.microsoft.com/office/drawing/2010/main" xmlns="">
+              <a14:hiddenFill xmlns="" xmlns:a14="http://schemas.microsoft.com/office/drawing/2010/main">
                 <a:solidFill>
                   <a:srgbClr val="FFFFFF"/>
                 </a:solidFill>
               </a14:hiddenFill>
             </a:ext>
             <a:ext uri="{91240B29-F687-4f45-9708-019B960494DF}">
-              <a14:hiddenLine xmlns:a14="http://schemas.microsoft.com/office/drawing/2010/main" xmlns="" w="9525">
+              <a14:hiddenLine xmlns="" xmlns:a14="http://schemas.microsoft.com/office/drawing/2010/main" w="9525">
                 <a:solidFill>
                   <a:srgbClr val="000000"/>
                 </a:solidFill>
@@ -5748,14 +5748,14 @@
           </a:ln>
           <a:extLst>
             <a:ext uri="{909E8E84-426E-40dd-AFC4-6F175D3DCCD1}">
-              <a14:hiddenFill xmlns:a14="http://schemas.microsoft.com/office/drawing/2010/main" xmlns="">
+              <a14:hiddenFill xmlns="" xmlns:a14="http://schemas.microsoft.com/office/drawing/2010/main">
                 <a:solidFill>
                   <a:srgbClr val="FFFFFF"/>
                 </a:solidFill>
               </a14:hiddenFill>
             </a:ext>
             <a:ext uri="{91240B29-F687-4f45-9708-019B960494DF}">
-              <a14:hiddenLine xmlns:a14="http://schemas.microsoft.com/office/drawing/2010/main" xmlns="" w="9525">
+              <a14:hiddenLine xmlns="" xmlns:a14="http://schemas.microsoft.com/office/drawing/2010/main" w="9525">
                 <a:solidFill>
                   <a:srgbClr val="000000"/>
                 </a:solidFill>
@@ -5802,14 +5802,14 @@
           </a:ln>
           <a:extLst>
             <a:ext uri="{909E8E84-426E-40dd-AFC4-6F175D3DCCD1}">
-              <a14:hiddenFill xmlns:a14="http://schemas.microsoft.com/office/drawing/2010/main" xmlns="">
+              <a14:hiddenFill xmlns="" xmlns:a14="http://schemas.microsoft.com/office/drawing/2010/main">
                 <a:solidFill>
                   <a:srgbClr val="FFFFFF"/>
                 </a:solidFill>
               </a14:hiddenFill>
             </a:ext>
             <a:ext uri="{91240B29-F687-4f45-9708-019B960494DF}">
-              <a14:hiddenLine xmlns:a14="http://schemas.microsoft.com/office/drawing/2010/main" xmlns="" w="9525">
+              <a14:hiddenLine xmlns="" xmlns:a14="http://schemas.microsoft.com/office/drawing/2010/main" w="9525">
                 <a:solidFill>
                   <a:srgbClr val="000000"/>
                 </a:solidFill>
@@ -7434,12 +7434,12 @@
           <a:effectLst/>
           <a:extLst>
             <a:ext uri="{909E8E84-426E-40dd-AFC4-6F175D3DCCD1}">
-              <a14:hiddenFill xmlns="" xmlns:a14="http://schemas.microsoft.com/office/drawing/2010/main">
+              <a14:hiddenFill xmlns:a14="http://schemas.microsoft.com/office/drawing/2010/main" xmlns="">
                 <a:noFill/>
               </a14:hiddenFill>
             </a:ext>
             <a:ext uri="{AF507438-7753-43e0-B8FC-AC1667EBCBE1}">
-              <a14:hiddenEffects xmlns="" xmlns:a14="http://schemas.microsoft.com/office/drawing/2010/main">
+              <a14:hiddenEffects xmlns:a14="http://schemas.microsoft.com/office/drawing/2010/main" xmlns="">
                 <a:effectLst>
                   <a:outerShdw blurRad="63500" dist="38099" dir="2700000" algn="ctr" rotWithShape="0">
                     <a:schemeClr val="bg2">
@@ -7487,12 +7487,12 @@
           <a:effectLst/>
           <a:extLst>
             <a:ext uri="{909E8E84-426E-40dd-AFC4-6F175D3DCCD1}">
-              <a14:hiddenFill xmlns="" xmlns:a14="http://schemas.microsoft.com/office/drawing/2010/main">
+              <a14:hiddenFill xmlns:a14="http://schemas.microsoft.com/office/drawing/2010/main" xmlns="">
                 <a:noFill/>
               </a14:hiddenFill>
             </a:ext>
             <a:ext uri="{AF507438-7753-43e0-B8FC-AC1667EBCBE1}">
-              <a14:hiddenEffects xmlns="" xmlns:a14="http://schemas.microsoft.com/office/drawing/2010/main">
+              <a14:hiddenEffects xmlns:a14="http://schemas.microsoft.com/office/drawing/2010/main" xmlns="">
                 <a:effectLst>
                   <a:outerShdw blurRad="63500" dist="38099" dir="2700000" algn="ctr" rotWithShape="0">
                     <a:schemeClr val="bg2">
@@ -7540,12 +7540,12 @@
           <a:effectLst/>
           <a:extLst>
             <a:ext uri="{909E8E84-426E-40dd-AFC4-6F175D3DCCD1}">
-              <a14:hiddenFill xmlns="" xmlns:a14="http://schemas.microsoft.com/office/drawing/2010/main">
+              <a14:hiddenFill xmlns:a14="http://schemas.microsoft.com/office/drawing/2010/main" xmlns="">
                 <a:noFill/>
               </a14:hiddenFill>
             </a:ext>
             <a:ext uri="{AF507438-7753-43e0-B8FC-AC1667EBCBE1}">
-              <a14:hiddenEffects xmlns="" xmlns:a14="http://schemas.microsoft.com/office/drawing/2010/main">
+              <a14:hiddenEffects xmlns:a14="http://schemas.microsoft.com/office/drawing/2010/main" xmlns="">
                 <a:effectLst>
                   <a:outerShdw blurRad="63500" dist="38099" dir="2700000" algn="ctr" rotWithShape="0">
                     <a:schemeClr val="bg2">
@@ -7593,12 +7593,12 @@
           <a:effectLst/>
           <a:extLst>
             <a:ext uri="{909E8E84-426E-40dd-AFC4-6F175D3DCCD1}">
-              <a14:hiddenFill xmlns="" xmlns:a14="http://schemas.microsoft.com/office/drawing/2010/main">
+              <a14:hiddenFill xmlns:a14="http://schemas.microsoft.com/office/drawing/2010/main" xmlns="">
                 <a:noFill/>
               </a14:hiddenFill>
             </a:ext>
             <a:ext uri="{AF507438-7753-43e0-B8FC-AC1667EBCBE1}">
-              <a14:hiddenEffects xmlns="" xmlns:a14="http://schemas.microsoft.com/office/drawing/2010/main">
+              <a14:hiddenEffects xmlns:a14="http://schemas.microsoft.com/office/drawing/2010/main" xmlns="">
                 <a:effectLst>
                   <a:outerShdw blurRad="63500" dist="38099" dir="2700000" algn="ctr" rotWithShape="0">
                     <a:schemeClr val="bg2">
@@ -7648,12 +7648,12 @@
           <a:effectLst/>
           <a:extLst>
             <a:ext uri="{909E8E84-426E-40dd-AFC4-6F175D3DCCD1}">
-              <a14:hiddenFill xmlns="" xmlns:a14="http://schemas.microsoft.com/office/drawing/2010/main">
+              <a14:hiddenFill xmlns:a14="http://schemas.microsoft.com/office/drawing/2010/main" xmlns="">
                 <a:noFill/>
               </a14:hiddenFill>
             </a:ext>
             <a:ext uri="{AF507438-7753-43e0-B8FC-AC1667EBCBE1}">
-              <a14:hiddenEffects xmlns="" xmlns:a14="http://schemas.microsoft.com/office/drawing/2010/main">
+              <a14:hiddenEffects xmlns:a14="http://schemas.microsoft.com/office/drawing/2010/main" xmlns="">
                 <a:effectLst>
                   <a:outerShdw blurRad="63500" dist="38099" dir="2700000" algn="ctr" rotWithShape="0">
                     <a:schemeClr val="bg2">
@@ -7703,12 +7703,12 @@
           <a:effectLst/>
           <a:extLst>
             <a:ext uri="{909E8E84-426E-40dd-AFC4-6F175D3DCCD1}">
-              <a14:hiddenFill xmlns="" xmlns:a14="http://schemas.microsoft.com/office/drawing/2010/main">
+              <a14:hiddenFill xmlns:a14="http://schemas.microsoft.com/office/drawing/2010/main" xmlns="">
                 <a:noFill/>
               </a14:hiddenFill>
             </a:ext>
             <a:ext uri="{AF507438-7753-43e0-B8FC-AC1667EBCBE1}">
-              <a14:hiddenEffects xmlns="" xmlns:a14="http://schemas.microsoft.com/office/drawing/2010/main">
+              <a14:hiddenEffects xmlns:a14="http://schemas.microsoft.com/office/drawing/2010/main" xmlns="">
                 <a:effectLst>
                   <a:outerShdw blurRad="63500" dist="38099" dir="2700000" algn="ctr" rotWithShape="0">
                     <a:schemeClr val="bg2">
@@ -7789,12 +7789,12 @@
           <a:effectLst/>
           <a:extLst>
             <a:ext uri="{909E8E84-426E-40dd-AFC4-6F175D3DCCD1}">
-              <a14:hiddenFill xmlns="" xmlns:a14="http://schemas.microsoft.com/office/drawing/2010/main">
+              <a14:hiddenFill xmlns:a14="http://schemas.microsoft.com/office/drawing/2010/main" xmlns="">
                 <a:noFill/>
               </a14:hiddenFill>
             </a:ext>
             <a:ext uri="{AF507438-7753-43e0-B8FC-AC1667EBCBE1}">
-              <a14:hiddenEffects xmlns="" xmlns:a14="http://schemas.microsoft.com/office/drawing/2010/main">
+              <a14:hiddenEffects xmlns:a14="http://schemas.microsoft.com/office/drawing/2010/main" xmlns="">
                 <a:effectLst>
                   <a:outerShdw blurRad="63500" dist="38099" dir="2700000" algn="ctr" rotWithShape="0">
                     <a:schemeClr val="bg2">
@@ -7842,12 +7842,12 @@
           <a:effectLst/>
           <a:extLst>
             <a:ext uri="{909E8E84-426E-40dd-AFC4-6F175D3DCCD1}">
-              <a14:hiddenFill xmlns="" xmlns:a14="http://schemas.microsoft.com/office/drawing/2010/main">
+              <a14:hiddenFill xmlns:a14="http://schemas.microsoft.com/office/drawing/2010/main" xmlns="">
                 <a:noFill/>
               </a14:hiddenFill>
             </a:ext>
             <a:ext uri="{AF507438-7753-43e0-B8FC-AC1667EBCBE1}">
-              <a14:hiddenEffects xmlns="" xmlns:a14="http://schemas.microsoft.com/office/drawing/2010/main">
+              <a14:hiddenEffects xmlns:a14="http://schemas.microsoft.com/office/drawing/2010/main" xmlns="">
                 <a:effectLst>
                   <a:outerShdw blurRad="63500" dist="38099" dir="2700000" algn="ctr" rotWithShape="0">
                     <a:schemeClr val="bg2">
@@ -7895,12 +7895,12 @@
           <a:effectLst/>
           <a:extLst>
             <a:ext uri="{909E8E84-426E-40dd-AFC4-6F175D3DCCD1}">
-              <a14:hiddenFill xmlns="" xmlns:a14="http://schemas.microsoft.com/office/drawing/2010/main">
+              <a14:hiddenFill xmlns:a14="http://schemas.microsoft.com/office/drawing/2010/main" xmlns="">
                 <a:noFill/>
               </a14:hiddenFill>
             </a:ext>
             <a:ext uri="{AF507438-7753-43e0-B8FC-AC1667EBCBE1}">
-              <a14:hiddenEffects xmlns="" xmlns:a14="http://schemas.microsoft.com/office/drawing/2010/main">
+              <a14:hiddenEffects xmlns:a14="http://schemas.microsoft.com/office/drawing/2010/main" xmlns="">
                 <a:effectLst>
                   <a:outerShdw blurRad="63500" dist="38099" dir="2700000" algn="ctr" rotWithShape="0">
                     <a:schemeClr val="bg2">
@@ -7948,12 +7948,12 @@
           <a:effectLst/>
           <a:extLst>
             <a:ext uri="{909E8E84-426E-40dd-AFC4-6F175D3DCCD1}">
-              <a14:hiddenFill xmlns="" xmlns:a14="http://schemas.microsoft.com/office/drawing/2010/main">
+              <a14:hiddenFill xmlns:a14="http://schemas.microsoft.com/office/drawing/2010/main" xmlns="">
                 <a:noFill/>
               </a14:hiddenFill>
             </a:ext>
             <a:ext uri="{AF507438-7753-43e0-B8FC-AC1667EBCBE1}">
-              <a14:hiddenEffects xmlns="" xmlns:a14="http://schemas.microsoft.com/office/drawing/2010/main">
+              <a14:hiddenEffects xmlns:a14="http://schemas.microsoft.com/office/drawing/2010/main" xmlns="">
                 <a:effectLst>
                   <a:outerShdw blurRad="63500" dist="38099" dir="2700000" algn="ctr" rotWithShape="0">
                     <a:schemeClr val="bg2">
@@ -8001,12 +8001,12 @@
           <a:effectLst/>
           <a:extLst>
             <a:ext uri="{909E8E84-426E-40dd-AFC4-6F175D3DCCD1}">
-              <a14:hiddenFill xmlns="" xmlns:a14="http://schemas.microsoft.com/office/drawing/2010/main">
+              <a14:hiddenFill xmlns:a14="http://schemas.microsoft.com/office/drawing/2010/main" xmlns="">
                 <a:noFill/>
               </a14:hiddenFill>
             </a:ext>
             <a:ext uri="{AF507438-7753-43e0-B8FC-AC1667EBCBE1}">
-              <a14:hiddenEffects xmlns="" xmlns:a14="http://schemas.microsoft.com/office/drawing/2010/main">
+              <a14:hiddenEffects xmlns:a14="http://schemas.microsoft.com/office/drawing/2010/main" xmlns="">
                 <a:effectLst>
                   <a:outerShdw blurRad="63500" dist="38099" dir="2700000" algn="ctr" rotWithShape="0">
                     <a:schemeClr val="bg2">
@@ -8054,12 +8054,12 @@
           <a:effectLst/>
           <a:extLst>
             <a:ext uri="{909E8E84-426E-40dd-AFC4-6F175D3DCCD1}">
-              <a14:hiddenFill xmlns="" xmlns:a14="http://schemas.microsoft.com/office/drawing/2010/main">
+              <a14:hiddenFill xmlns:a14="http://schemas.microsoft.com/office/drawing/2010/main" xmlns="">
                 <a:noFill/>
               </a14:hiddenFill>
             </a:ext>
             <a:ext uri="{AF507438-7753-43e0-B8FC-AC1667EBCBE1}">
-              <a14:hiddenEffects xmlns="" xmlns:a14="http://schemas.microsoft.com/office/drawing/2010/main">
+              <a14:hiddenEffects xmlns:a14="http://schemas.microsoft.com/office/drawing/2010/main" xmlns="">
                 <a:effectLst>
                   <a:outerShdw blurRad="63500" dist="38099" dir="2700000" algn="ctr" rotWithShape="0">
                     <a:schemeClr val="bg2">
@@ -8115,14 +8115,14 @@
           <a:effectLst/>
           <a:extLst>
             <a:ext uri="{909E8E84-426E-40dd-AFC4-6F175D3DCCD1}">
-              <a14:hiddenFill xmlns="" xmlns:a14="http://schemas.microsoft.com/office/drawing/2010/main">
+              <a14:hiddenFill xmlns:a14="http://schemas.microsoft.com/office/drawing/2010/main" xmlns="">
                 <a:solidFill>
                   <a:schemeClr val="accent1"/>
                 </a:solidFill>
               </a14:hiddenFill>
             </a:ext>
             <a:ext uri="{91240B29-F687-4f45-9708-019B960494DF}">
-              <a14:hiddenLine xmlns="" xmlns:a14="http://schemas.microsoft.com/office/drawing/2010/main" w="9525">
+              <a14:hiddenLine xmlns:a14="http://schemas.microsoft.com/office/drawing/2010/main" xmlns="" w="9525">
                 <a:solidFill>
                   <a:schemeClr val="tx1"/>
                 </a:solidFill>
@@ -8132,7 +8132,7 @@
               </a14:hiddenLine>
             </a:ext>
             <a:ext uri="{AF507438-7753-43e0-B8FC-AC1667EBCBE1}">
-              <a14:hiddenEffects xmlns="" xmlns:a14="http://schemas.microsoft.com/office/drawing/2010/main">
+              <a14:hiddenEffects xmlns:a14="http://schemas.microsoft.com/office/drawing/2010/main" xmlns="">
                 <a:effectLst>
                   <a:outerShdw blurRad="63500" dist="38099" dir="2700000" algn="ctr" rotWithShape="0">
                     <a:schemeClr val="bg2">
@@ -8173,12 +8173,12 @@
           <a:effectLst/>
           <a:extLst>
             <a:ext uri="{909E8E84-426E-40dd-AFC4-6F175D3DCCD1}">
-              <a14:hiddenFill xmlns="" xmlns:a14="http://schemas.microsoft.com/office/drawing/2010/main">
+              <a14:hiddenFill xmlns:a14="http://schemas.microsoft.com/office/drawing/2010/main" xmlns="">
                 <a:noFill/>
               </a14:hiddenFill>
             </a:ext>
             <a:ext uri="{AF507438-7753-43e0-B8FC-AC1667EBCBE1}">
-              <a14:hiddenEffects xmlns="" xmlns:a14="http://schemas.microsoft.com/office/drawing/2010/main">
+              <a14:hiddenEffects xmlns:a14="http://schemas.microsoft.com/office/drawing/2010/main" xmlns="">
                 <a:effectLst>
                   <a:outerShdw blurRad="63500" dist="38099" dir="2700000" algn="ctr" rotWithShape="0">
                     <a:schemeClr val="bg2">
@@ -8226,12 +8226,12 @@
           <a:effectLst/>
           <a:extLst>
             <a:ext uri="{909E8E84-426E-40dd-AFC4-6F175D3DCCD1}">
-              <a14:hiddenFill xmlns="" xmlns:a14="http://schemas.microsoft.com/office/drawing/2010/main">
+              <a14:hiddenFill xmlns:a14="http://schemas.microsoft.com/office/drawing/2010/main" xmlns="">
                 <a:noFill/>
               </a14:hiddenFill>
             </a:ext>
             <a:ext uri="{AF507438-7753-43e0-B8FC-AC1667EBCBE1}">
-              <a14:hiddenEffects xmlns="" xmlns:a14="http://schemas.microsoft.com/office/drawing/2010/main">
+              <a14:hiddenEffects xmlns:a14="http://schemas.microsoft.com/office/drawing/2010/main" xmlns="">
                 <a:effectLst>
                   <a:outerShdw blurRad="63500" dist="38099" dir="2700000" algn="ctr" rotWithShape="0">
                     <a:schemeClr val="bg2">
@@ -8274,14 +8274,14 @@
           <a:effectLst/>
           <a:extLst>
             <a:ext uri="{909E8E84-426E-40dd-AFC4-6F175D3DCCD1}">
-              <a14:hiddenFill xmlns="" xmlns:a14="http://schemas.microsoft.com/office/drawing/2010/main">
+              <a14:hiddenFill xmlns:a14="http://schemas.microsoft.com/office/drawing/2010/main" xmlns="">
                 <a:solidFill>
                   <a:schemeClr val="accent1"/>
                 </a:solidFill>
               </a14:hiddenFill>
             </a:ext>
             <a:ext uri="{91240B29-F687-4f45-9708-019B960494DF}">
-              <a14:hiddenLine xmlns="" xmlns:a14="http://schemas.microsoft.com/office/drawing/2010/main" w="9525">
+              <a14:hiddenLine xmlns:a14="http://schemas.microsoft.com/office/drawing/2010/main" xmlns="" w="9525">
                 <a:solidFill>
                   <a:schemeClr val="tx1"/>
                 </a:solidFill>
@@ -8291,7 +8291,7 @@
               </a14:hiddenLine>
             </a:ext>
             <a:ext uri="{AF507438-7753-43e0-B8FC-AC1667EBCBE1}">
-              <a14:hiddenEffects xmlns="" xmlns:a14="http://schemas.microsoft.com/office/drawing/2010/main">
+              <a14:hiddenEffects xmlns:a14="http://schemas.microsoft.com/office/drawing/2010/main" xmlns="">
                 <a:effectLst>
                   <a:outerShdw blurRad="63500" dist="38099" dir="2700000" algn="ctr" rotWithShape="0">
                     <a:schemeClr val="bg2">
@@ -8362,12 +8362,12 @@
           <a:effectLst/>
           <a:extLst>
             <a:ext uri="{909E8E84-426E-40dd-AFC4-6F175D3DCCD1}">
-              <a14:hiddenFill xmlns="" xmlns:a14="http://schemas.microsoft.com/office/drawing/2010/main">
+              <a14:hiddenFill xmlns:a14="http://schemas.microsoft.com/office/drawing/2010/main" xmlns="">
                 <a:noFill/>
               </a14:hiddenFill>
             </a:ext>
             <a:ext uri="{AF507438-7753-43e0-B8FC-AC1667EBCBE1}">
-              <a14:hiddenEffects xmlns="" xmlns:a14="http://schemas.microsoft.com/office/drawing/2010/main">
+              <a14:hiddenEffects xmlns:a14="http://schemas.microsoft.com/office/drawing/2010/main" xmlns="">
                 <a:effectLst>
                   <a:outerShdw blurRad="63500" dist="38099" dir="2700000" algn="ctr" rotWithShape="0">
                     <a:schemeClr val="bg2">
@@ -8410,14 +8410,14 @@
           <a:effectLst/>
           <a:extLst>
             <a:ext uri="{909E8E84-426E-40dd-AFC4-6F175D3DCCD1}">
-              <a14:hiddenFill xmlns="" xmlns:a14="http://schemas.microsoft.com/office/drawing/2010/main">
+              <a14:hiddenFill xmlns:a14="http://schemas.microsoft.com/office/drawing/2010/main" xmlns="">
                 <a:solidFill>
                   <a:schemeClr val="accent1"/>
                 </a:solidFill>
               </a14:hiddenFill>
             </a:ext>
             <a:ext uri="{91240B29-F687-4f45-9708-019B960494DF}">
-              <a14:hiddenLine xmlns="" xmlns:a14="http://schemas.microsoft.com/office/drawing/2010/main" w="9525">
+              <a14:hiddenLine xmlns:a14="http://schemas.microsoft.com/office/drawing/2010/main" xmlns="" w="9525">
                 <a:solidFill>
                   <a:schemeClr val="tx1"/>
                 </a:solidFill>
@@ -8427,7 +8427,7 @@
               </a14:hiddenLine>
             </a:ext>
             <a:ext uri="{AF507438-7753-43e0-B8FC-AC1667EBCBE1}">
-              <a14:hiddenEffects xmlns="" xmlns:a14="http://schemas.microsoft.com/office/drawing/2010/main">
+              <a14:hiddenEffects xmlns:a14="http://schemas.microsoft.com/office/drawing/2010/main" xmlns="">
                 <a:effectLst>
                   <a:outerShdw blurRad="63500" dist="38099" dir="2700000" algn="ctr" rotWithShape="0">
                     <a:schemeClr val="bg2">
@@ -8552,14 +8552,14 @@
           <a:effectLst/>
           <a:extLst>
             <a:ext uri="{909E8E84-426E-40dd-AFC4-6F175D3DCCD1}">
-              <a14:hiddenFill xmlns="" xmlns:a14="http://schemas.microsoft.com/office/drawing/2010/main">
+              <a14:hiddenFill xmlns:a14="http://schemas.microsoft.com/office/drawing/2010/main" xmlns="">
                 <a:solidFill>
                   <a:schemeClr val="accent1"/>
                 </a:solidFill>
               </a14:hiddenFill>
             </a:ext>
             <a:ext uri="{91240B29-F687-4f45-9708-019B960494DF}">
-              <a14:hiddenLine xmlns="" xmlns:a14="http://schemas.microsoft.com/office/drawing/2010/main" w="9525">
+              <a14:hiddenLine xmlns:a14="http://schemas.microsoft.com/office/drawing/2010/main" xmlns="" w="9525">
                 <a:solidFill>
                   <a:schemeClr val="tx1"/>
                 </a:solidFill>
@@ -8569,7 +8569,7 @@
               </a14:hiddenLine>
             </a:ext>
             <a:ext uri="{AF507438-7753-43e0-B8FC-AC1667EBCBE1}">
-              <a14:hiddenEffects xmlns="" xmlns:a14="http://schemas.microsoft.com/office/drawing/2010/main">
+              <a14:hiddenEffects xmlns:a14="http://schemas.microsoft.com/office/drawing/2010/main" xmlns="">
                 <a:effectLst>
                   <a:outerShdw blurRad="63500" dist="38099" dir="2700000" algn="ctr" rotWithShape="0">
                     <a:schemeClr val="bg2">
@@ -8668,14 +8668,14 @@
           <a:effectLst/>
           <a:extLst>
             <a:ext uri="{909E8E84-426E-40dd-AFC4-6F175D3DCCD1}">
-              <a14:hiddenFill xmlns="" xmlns:a14="http://schemas.microsoft.com/office/drawing/2010/main">
+              <a14:hiddenFill xmlns:a14="http://schemas.microsoft.com/office/drawing/2010/main" xmlns="">
                 <a:solidFill>
                   <a:schemeClr val="accent1"/>
                 </a:solidFill>
               </a14:hiddenFill>
             </a:ext>
             <a:ext uri="{91240B29-F687-4f45-9708-019B960494DF}">
-              <a14:hiddenLine xmlns="" xmlns:a14="http://schemas.microsoft.com/office/drawing/2010/main" w="9525">
+              <a14:hiddenLine xmlns:a14="http://schemas.microsoft.com/office/drawing/2010/main" xmlns="" w="9525">
                 <a:solidFill>
                   <a:schemeClr val="tx1"/>
                 </a:solidFill>
@@ -8685,7 +8685,7 @@
               </a14:hiddenLine>
             </a:ext>
             <a:ext uri="{AF507438-7753-43e0-B8FC-AC1667EBCBE1}">
-              <a14:hiddenEffects xmlns="" xmlns:a14="http://schemas.microsoft.com/office/drawing/2010/main">
+              <a14:hiddenEffects xmlns:a14="http://schemas.microsoft.com/office/drawing/2010/main" xmlns="">
                 <a:effectLst>
                   <a:outerShdw blurRad="63500" dist="38099" dir="2700000" algn="ctr" rotWithShape="0">
                     <a:schemeClr val="bg2">
@@ -8714,7 +8714,7 @@
           <a:graphicData uri="http://schemas.openxmlformats.org/presentationml/2006/ole">
             <mc:AlternateContent xmlns:mc="http://schemas.openxmlformats.org/markup-compatibility/2006">
               <mc:Choice xmlns:v="urn:schemas-microsoft-com:vml" Requires="v">
-                <p:oleObj spid="_x0000_s1037" name="Equation" r:id="rId5" imgW="889000" imgH="292100" progId="Equation.3">
+                <p:oleObj spid="_x0000_s1046" name="Equation" r:id="rId5" imgW="889000" imgH="292100" progId="Equation.3">
                   <p:embed/>
                 </p:oleObj>
               </mc:Choice>
@@ -8757,14 +8757,14 @@
                       <a:effectLst/>
                       <a:extLst>
                         <a:ext uri="{909E8E84-426E-40dd-AFC4-6F175D3DCCD1}">
-                          <a14:hiddenFill xmlns="" xmlns:a14="http://schemas.microsoft.com/office/drawing/2010/main">
+                          <a14:hiddenFill xmlns:a14="http://schemas.microsoft.com/office/drawing/2010/main" xmlns="">
                             <a:solidFill>
                               <a:schemeClr val="accent1"/>
                             </a:solidFill>
                           </a14:hiddenFill>
                         </a:ext>
                         <a:ext uri="{91240B29-F687-4f45-9708-019B960494DF}">
-                          <a14:hiddenLine xmlns="" xmlns:a14="http://schemas.microsoft.com/office/drawing/2010/main" w="9525">
+                          <a14:hiddenLine xmlns:a14="http://schemas.microsoft.com/office/drawing/2010/main" xmlns="" w="9525">
                             <a:solidFill>
                               <a:schemeClr val="tx1"/>
                             </a:solidFill>
@@ -8774,7 +8774,7 @@
                           </a14:hiddenLine>
                         </a:ext>
                         <a:ext uri="{AF507438-7753-43e0-B8FC-AC1667EBCBE1}">
-                          <a14:hiddenEffects xmlns="" xmlns:a14="http://schemas.microsoft.com/office/drawing/2010/main">
+                          <a14:hiddenEffects xmlns:a14="http://schemas.microsoft.com/office/drawing/2010/main" xmlns="">
                             <a:effectLst>
                               <a:outerShdw blurRad="63500" dist="38099" dir="2700000" algn="ctr" rotWithShape="0">
                                 <a:schemeClr val="bg2">
@@ -8816,14 +8816,14 @@
           <a:effectLst/>
           <a:extLst>
             <a:ext uri="{909E8E84-426E-40dd-AFC4-6F175D3DCCD1}">
-              <a14:hiddenFill xmlns="" xmlns:a14="http://schemas.microsoft.com/office/drawing/2010/main">
+              <a14:hiddenFill xmlns:a14="http://schemas.microsoft.com/office/drawing/2010/main" xmlns="">
                 <a:solidFill>
                   <a:schemeClr val="accent1"/>
                 </a:solidFill>
               </a14:hiddenFill>
             </a:ext>
             <a:ext uri="{91240B29-F687-4f45-9708-019B960494DF}">
-              <a14:hiddenLine xmlns="" xmlns:a14="http://schemas.microsoft.com/office/drawing/2010/main" w="9525">
+              <a14:hiddenLine xmlns:a14="http://schemas.microsoft.com/office/drawing/2010/main" xmlns="" w="9525">
                 <a:solidFill>
                   <a:schemeClr val="tx1"/>
                 </a:solidFill>
@@ -8833,7 +8833,7 @@
               </a14:hiddenLine>
             </a:ext>
             <a:ext uri="{AF507438-7753-43e0-B8FC-AC1667EBCBE1}">
-              <a14:hiddenEffects xmlns="" xmlns:a14="http://schemas.microsoft.com/office/drawing/2010/main">
+              <a14:hiddenEffects xmlns:a14="http://schemas.microsoft.com/office/drawing/2010/main" xmlns="">
                 <a:effectLst>
                   <a:outerShdw blurRad="63500" dist="38099" dir="2700000" algn="ctr" rotWithShape="0">
                     <a:schemeClr val="bg2">
@@ -8885,7 +8885,7 @@
           <a:graphicData uri="http://schemas.openxmlformats.org/presentationml/2006/ole">
             <mc:AlternateContent xmlns:mc="http://schemas.openxmlformats.org/markup-compatibility/2006">
               <mc:Choice xmlns:v="urn:schemas-microsoft-com:vml" Requires="v">
-                <p:oleObj spid="_x0000_s1038" name="Equation" r:id="rId7" imgW="368300" imgH="292100" progId="Equation.3">
+                <p:oleObj spid="_x0000_s1047" name="Equation" r:id="rId7" imgW="368300" imgH="292100" progId="Equation.3">
                   <p:embed/>
                 </p:oleObj>
               </mc:Choice>
@@ -8928,14 +8928,14 @@
                       <a:effectLst/>
                       <a:extLst>
                         <a:ext uri="{909E8E84-426E-40dd-AFC4-6F175D3DCCD1}">
-                          <a14:hiddenFill xmlns="" xmlns:a14="http://schemas.microsoft.com/office/drawing/2010/main">
+                          <a14:hiddenFill xmlns:a14="http://schemas.microsoft.com/office/drawing/2010/main" xmlns="">
                             <a:solidFill>
                               <a:schemeClr val="accent1"/>
                             </a:solidFill>
                           </a14:hiddenFill>
                         </a:ext>
                         <a:ext uri="{91240B29-F687-4f45-9708-019B960494DF}">
-                          <a14:hiddenLine xmlns="" xmlns:a14="http://schemas.microsoft.com/office/drawing/2010/main" w="9525">
+                          <a14:hiddenLine xmlns:a14="http://schemas.microsoft.com/office/drawing/2010/main" xmlns="" w="9525">
                             <a:solidFill>
                               <a:schemeClr val="tx1"/>
                             </a:solidFill>
@@ -8945,7 +8945,7 @@
                           </a14:hiddenLine>
                         </a:ext>
                         <a:ext uri="{AF507438-7753-43e0-B8FC-AC1667EBCBE1}">
-                          <a14:hiddenEffects xmlns="" xmlns:a14="http://schemas.microsoft.com/office/drawing/2010/main">
+                          <a14:hiddenEffects xmlns:a14="http://schemas.microsoft.com/office/drawing/2010/main" xmlns="">
                             <a:effectLst>
                               <a:outerShdw blurRad="63500" dist="38099" dir="2700000" algn="ctr" rotWithShape="0">
                                 <a:schemeClr val="bg2">
@@ -8987,14 +8987,14 @@
           <a:effectLst/>
           <a:extLst>
             <a:ext uri="{909E8E84-426E-40dd-AFC4-6F175D3DCCD1}">
-              <a14:hiddenFill xmlns="" xmlns:a14="http://schemas.microsoft.com/office/drawing/2010/main">
+              <a14:hiddenFill xmlns:a14="http://schemas.microsoft.com/office/drawing/2010/main" xmlns="">
                 <a:solidFill>
                   <a:schemeClr val="accent1"/>
                 </a:solidFill>
               </a14:hiddenFill>
             </a:ext>
             <a:ext uri="{91240B29-F687-4f45-9708-019B960494DF}">
-              <a14:hiddenLine xmlns="" xmlns:a14="http://schemas.microsoft.com/office/drawing/2010/main" w="9525">
+              <a14:hiddenLine xmlns:a14="http://schemas.microsoft.com/office/drawing/2010/main" xmlns="" w="9525">
                 <a:solidFill>
                   <a:schemeClr val="tx1"/>
                 </a:solidFill>
@@ -9004,7 +9004,7 @@
               </a14:hiddenLine>
             </a:ext>
             <a:ext uri="{AF507438-7753-43e0-B8FC-AC1667EBCBE1}">
-              <a14:hiddenEffects xmlns="" xmlns:a14="http://schemas.microsoft.com/office/drawing/2010/main">
+              <a14:hiddenEffects xmlns:a14="http://schemas.microsoft.com/office/drawing/2010/main" xmlns="">
                 <a:effectLst>
                   <a:outerShdw blurRad="63500" dist="38099" dir="2700000" algn="ctr" rotWithShape="0">
                     <a:schemeClr val="bg2">
@@ -9074,12 +9074,12 @@
             <a:effectLst/>
             <a:extLst>
               <a:ext uri="{909E8E84-426E-40dd-AFC4-6F175D3DCCD1}">
-                <a14:hiddenFill xmlns="" xmlns:a14="http://schemas.microsoft.com/office/drawing/2010/main">
+                <a14:hiddenFill xmlns:a14="http://schemas.microsoft.com/office/drawing/2010/main" xmlns="">
                   <a:noFill/>
                 </a14:hiddenFill>
               </a:ext>
               <a:ext uri="{AF507438-7753-43e0-B8FC-AC1667EBCBE1}">
-                <a14:hiddenEffects xmlns="" xmlns:a14="http://schemas.microsoft.com/office/drawing/2010/main">
+                <a14:hiddenEffects xmlns:a14="http://schemas.microsoft.com/office/drawing/2010/main" xmlns="">
                   <a:effectLst>
                     <a:outerShdw blurRad="63500" dist="38099" dir="2700000" algn="ctr" rotWithShape="0">
                       <a:schemeClr val="bg2">
@@ -9127,12 +9127,12 @@
             <a:effectLst/>
             <a:extLst>
               <a:ext uri="{909E8E84-426E-40dd-AFC4-6F175D3DCCD1}">
-                <a14:hiddenFill xmlns="" xmlns:a14="http://schemas.microsoft.com/office/drawing/2010/main">
+                <a14:hiddenFill xmlns:a14="http://schemas.microsoft.com/office/drawing/2010/main" xmlns="">
                   <a:noFill/>
                 </a14:hiddenFill>
               </a:ext>
               <a:ext uri="{AF507438-7753-43e0-B8FC-AC1667EBCBE1}">
-                <a14:hiddenEffects xmlns="" xmlns:a14="http://schemas.microsoft.com/office/drawing/2010/main">
+                <a14:hiddenEffects xmlns:a14="http://schemas.microsoft.com/office/drawing/2010/main" xmlns="">
                   <a:effectLst>
                     <a:outerShdw blurRad="63500" dist="38099" dir="2700000" algn="ctr" rotWithShape="0">
                       <a:schemeClr val="bg2">
@@ -9180,12 +9180,12 @@
             <a:effectLst/>
             <a:extLst>
               <a:ext uri="{909E8E84-426E-40dd-AFC4-6F175D3DCCD1}">
-                <a14:hiddenFill xmlns="" xmlns:a14="http://schemas.microsoft.com/office/drawing/2010/main">
+                <a14:hiddenFill xmlns:a14="http://schemas.microsoft.com/office/drawing/2010/main" xmlns="">
                   <a:noFill/>
                 </a14:hiddenFill>
               </a:ext>
               <a:ext uri="{AF507438-7753-43e0-B8FC-AC1667EBCBE1}">
-                <a14:hiddenEffects xmlns="" xmlns:a14="http://schemas.microsoft.com/office/drawing/2010/main">
+                <a14:hiddenEffects xmlns:a14="http://schemas.microsoft.com/office/drawing/2010/main" xmlns="">
                   <a:effectLst>
                     <a:outerShdw blurRad="63500" dist="38099" dir="2700000" algn="ctr" rotWithShape="0">
                       <a:schemeClr val="bg2">
@@ -9233,12 +9233,12 @@
             <a:effectLst/>
             <a:extLst>
               <a:ext uri="{909E8E84-426E-40dd-AFC4-6F175D3DCCD1}">
-                <a14:hiddenFill xmlns="" xmlns:a14="http://schemas.microsoft.com/office/drawing/2010/main">
+                <a14:hiddenFill xmlns:a14="http://schemas.microsoft.com/office/drawing/2010/main" xmlns="">
                   <a:noFill/>
                 </a14:hiddenFill>
               </a:ext>
               <a:ext uri="{AF507438-7753-43e0-B8FC-AC1667EBCBE1}">
-                <a14:hiddenEffects xmlns="" xmlns:a14="http://schemas.microsoft.com/office/drawing/2010/main">
+                <a14:hiddenEffects xmlns:a14="http://schemas.microsoft.com/office/drawing/2010/main" xmlns="">
                   <a:effectLst>
                     <a:outerShdw blurRad="63500" dist="38099" dir="2700000" algn="ctr" rotWithShape="0">
                       <a:schemeClr val="bg2">
@@ -9286,12 +9286,12 @@
             <a:effectLst/>
             <a:extLst>
               <a:ext uri="{909E8E84-426E-40dd-AFC4-6F175D3DCCD1}">
-                <a14:hiddenFill xmlns="" xmlns:a14="http://schemas.microsoft.com/office/drawing/2010/main">
+                <a14:hiddenFill xmlns:a14="http://schemas.microsoft.com/office/drawing/2010/main" xmlns="">
                   <a:noFill/>
                 </a14:hiddenFill>
               </a:ext>
               <a:ext uri="{AF507438-7753-43e0-B8FC-AC1667EBCBE1}">
-                <a14:hiddenEffects xmlns="" xmlns:a14="http://schemas.microsoft.com/office/drawing/2010/main">
+                <a14:hiddenEffects xmlns:a14="http://schemas.microsoft.com/office/drawing/2010/main" xmlns="">
                   <a:effectLst>
                     <a:outerShdw blurRad="63500" dist="38099" dir="2700000" algn="ctr" rotWithShape="0">
                       <a:schemeClr val="bg2">
@@ -9339,12 +9339,12 @@
             <a:effectLst/>
             <a:extLst>
               <a:ext uri="{909E8E84-426E-40dd-AFC4-6F175D3DCCD1}">
-                <a14:hiddenFill xmlns="" xmlns:a14="http://schemas.microsoft.com/office/drawing/2010/main">
+                <a14:hiddenFill xmlns:a14="http://schemas.microsoft.com/office/drawing/2010/main" xmlns="">
                   <a:noFill/>
                 </a14:hiddenFill>
               </a:ext>
               <a:ext uri="{AF507438-7753-43e0-B8FC-AC1667EBCBE1}">
-                <a14:hiddenEffects xmlns="" xmlns:a14="http://schemas.microsoft.com/office/drawing/2010/main">
+                <a14:hiddenEffects xmlns:a14="http://schemas.microsoft.com/office/drawing/2010/main" xmlns="">
                   <a:effectLst>
                     <a:outerShdw blurRad="63500" dist="38099" dir="2700000" algn="ctr" rotWithShape="0">
                       <a:schemeClr val="bg2">
@@ -9381,7 +9381,7 @@
           <a:graphicData uri="http://schemas.openxmlformats.org/presentationml/2006/ole">
             <mc:AlternateContent xmlns:mc="http://schemas.openxmlformats.org/markup-compatibility/2006">
               <mc:Choice xmlns:v="urn:schemas-microsoft-com:vml" Requires="v">
-                <p:oleObj spid="_x0000_s1039" name="Equation" r:id="rId9" imgW="1371600" imgH="774700" progId="Equation.3">
+                <p:oleObj spid="_x0000_s1048" name="Equation" r:id="rId9" imgW="1371600" imgH="774700" progId="Equation.3">
                   <p:embed/>
                 </p:oleObj>
               </mc:Choice>
@@ -9594,6 +9594,53 @@
           </a:p>
         </p:txBody>
       </p:sp>
+      <p:sp>
+        <p:nvSpPr>
+          <p:cNvPr id="5" name="TextBox 4">
+            <a:extLst>
+              <a:ext uri="{FF2B5EF4-FFF2-40B4-BE49-F238E27FC236}">
+                <a16:creationId xmlns:a16="http://schemas.microsoft.com/office/drawing/2014/main" id="{4C459BD3-1B55-1940-A65E-4E1397B3C952}"/>
+              </a:ext>
+            </a:extLst>
+          </p:cNvPr>
+          <p:cNvSpPr txBox="1"/>
+          <p:nvPr/>
+        </p:nvSpPr>
+        <p:spPr>
+          <a:xfrm>
+            <a:off x="9924932" y="5937812"/>
+            <a:ext cx="2170612" cy="707886"/>
+          </a:xfrm>
+          <a:prstGeom prst="rect">
+            <a:avLst/>
+          </a:prstGeom>
+          <a:noFill/>
+        </p:spPr>
+        <p:txBody>
+          <a:bodyPr wrap="square" rtlCol="0">
+            <a:spAutoFit/>
+          </a:bodyPr>
+          <a:lstStyle/>
+          <a:p>
+            <a:r>
+              <a:rPr lang="en-US" sz="2000" dirty="0">
+                <a:latin typeface="Arial" panose="020B0604020202020204" pitchFamily="34" charset="0"/>
+                <a:cs typeface="Arial" panose="020B0604020202020204" pitchFamily="34" charset="0"/>
+              </a:rPr>
+              <a:t>Li et al., 2017</a:t>
+            </a:r>
+          </a:p>
+          <a:p>
+            <a:r>
+              <a:rPr lang="en-US" sz="2000" dirty="0">
+                <a:latin typeface="Arial" panose="020B0604020202020204" pitchFamily="34" charset="0"/>
+                <a:cs typeface="Arial" panose="020B0604020202020204" pitchFamily="34" charset="0"/>
+              </a:rPr>
+              <a:t>New Phytologist</a:t>
+            </a:r>
+          </a:p>
+        </p:txBody>
+      </p:sp>
     </p:spTree>
     <p:extLst>
       <p:ext uri="{BB962C8B-B14F-4D97-AF65-F5344CB8AC3E}">
@@ -9647,14 +9694,14 @@
           <a:effectLst/>
           <a:extLst>
             <a:ext uri="{909E8E84-426E-40dd-AFC4-6F175D3DCCD1}">
-              <a14:hiddenFill xmlns="" xmlns:a14="http://schemas.microsoft.com/office/drawing/2010/main">
+              <a14:hiddenFill xmlns:a14="http://schemas.microsoft.com/office/drawing/2010/main" xmlns="">
                 <a:solidFill>
                   <a:schemeClr val="accent1"/>
                 </a:solidFill>
               </a14:hiddenFill>
             </a:ext>
             <a:ext uri="{91240B29-F687-4f45-9708-019B960494DF}">
-              <a14:hiddenLine xmlns="" xmlns:a14="http://schemas.microsoft.com/office/drawing/2010/main" w="9525">
+              <a14:hiddenLine xmlns:a14="http://schemas.microsoft.com/office/drawing/2010/main" xmlns="" w="9525">
                 <a:solidFill>
                   <a:schemeClr val="tx1"/>
                 </a:solidFill>
@@ -9664,7 +9711,7 @@
               </a14:hiddenLine>
             </a:ext>
             <a:ext uri="{AF507438-7753-43e0-B8FC-AC1667EBCBE1}">
-              <a14:hiddenEffects xmlns="" xmlns:a14="http://schemas.microsoft.com/office/drawing/2010/main">
+              <a14:hiddenEffects xmlns:a14="http://schemas.microsoft.com/office/drawing/2010/main" xmlns="">
                 <a:effectLst>
                   <a:outerShdw blurRad="63500" dist="38099" dir="2700000" algn="ctr" rotWithShape="0">
                     <a:schemeClr val="bg2">
@@ -11216,14 +11263,14 @@
           <a:effectLst/>
           <a:extLst>
             <a:ext uri="{909E8E84-426E-40dd-AFC4-6F175D3DCCD1}">
-              <a14:hiddenFill xmlns="" xmlns:a14="http://schemas.microsoft.com/office/drawing/2010/main">
+              <a14:hiddenFill xmlns:a14="http://schemas.microsoft.com/office/drawing/2010/main" xmlns="">
                 <a:solidFill>
                   <a:schemeClr val="accent1"/>
                 </a:solidFill>
               </a14:hiddenFill>
             </a:ext>
             <a:ext uri="{91240B29-F687-4f45-9708-019B960494DF}">
-              <a14:hiddenLine xmlns="" xmlns:a14="http://schemas.microsoft.com/office/drawing/2010/main" w="9525">
+              <a14:hiddenLine xmlns:a14="http://schemas.microsoft.com/office/drawing/2010/main" xmlns="" w="9525">
                 <a:solidFill>
                   <a:schemeClr val="tx1"/>
                 </a:solidFill>
@@ -11233,7 +11280,7 @@
               </a14:hiddenLine>
             </a:ext>
             <a:ext uri="{AF507438-7753-43e0-B8FC-AC1667EBCBE1}">
-              <a14:hiddenEffects xmlns="" xmlns:a14="http://schemas.microsoft.com/office/drawing/2010/main">
+              <a14:hiddenEffects xmlns:a14="http://schemas.microsoft.com/office/drawing/2010/main" xmlns="">
                 <a:effectLst>
                   <a:outerShdw blurRad="63500" dist="38099" dir="2700000" algn="ctr" rotWithShape="0">
                     <a:schemeClr val="bg2">
@@ -11954,14 +12001,14 @@
           <a:effectLst/>
           <a:extLst>
             <a:ext uri="{909E8E84-426E-40dd-AFC4-6F175D3DCCD1}">
-              <a14:hiddenFill xmlns="" xmlns:a14="http://schemas.microsoft.com/office/drawing/2010/main">
+              <a14:hiddenFill xmlns:a14="http://schemas.microsoft.com/office/drawing/2010/main" xmlns="">
                 <a:solidFill>
                   <a:schemeClr val="accent1"/>
                 </a:solidFill>
               </a14:hiddenFill>
             </a:ext>
             <a:ext uri="{91240B29-F687-4f45-9708-019B960494DF}">
-              <a14:hiddenLine xmlns="" xmlns:a14="http://schemas.microsoft.com/office/drawing/2010/main" w="9525">
+              <a14:hiddenLine xmlns:a14="http://schemas.microsoft.com/office/drawing/2010/main" xmlns="" w="9525">
                 <a:solidFill>
                   <a:schemeClr val="tx1"/>
                 </a:solidFill>
@@ -11971,7 +12018,7 @@
               </a14:hiddenLine>
             </a:ext>
             <a:ext uri="{AF507438-7753-43e0-B8FC-AC1667EBCBE1}">
-              <a14:hiddenEffects xmlns="" xmlns:a14="http://schemas.microsoft.com/office/drawing/2010/main">
+              <a14:hiddenEffects xmlns:a14="http://schemas.microsoft.com/office/drawing/2010/main" xmlns="">
                 <a:effectLst>
                   <a:outerShdw blurRad="63500" dist="38099" dir="2700000" algn="ctr" rotWithShape="0">
                     <a:schemeClr val="bg2">
@@ -12485,14 +12532,14 @@
           <a:effectLst/>
           <a:extLst>
             <a:ext uri="{909E8E84-426E-40dd-AFC4-6F175D3DCCD1}">
-              <a14:hiddenFill xmlns="" xmlns:a14="http://schemas.microsoft.com/office/drawing/2010/main">
+              <a14:hiddenFill xmlns:a14="http://schemas.microsoft.com/office/drawing/2010/main" xmlns="">
                 <a:solidFill>
                   <a:schemeClr val="accent1"/>
                 </a:solidFill>
               </a14:hiddenFill>
             </a:ext>
             <a:ext uri="{91240B29-F687-4f45-9708-019B960494DF}">
-              <a14:hiddenLine xmlns="" xmlns:a14="http://schemas.microsoft.com/office/drawing/2010/main" w="9525">
+              <a14:hiddenLine xmlns:a14="http://schemas.microsoft.com/office/drawing/2010/main" xmlns="" w="9525">
                 <a:solidFill>
                   <a:schemeClr val="tx1"/>
                 </a:solidFill>
@@ -12502,7 +12549,7 @@
               </a14:hiddenLine>
             </a:ext>
             <a:ext uri="{AF507438-7753-43e0-B8FC-AC1667EBCBE1}">
-              <a14:hiddenEffects xmlns="" xmlns:a14="http://schemas.microsoft.com/office/drawing/2010/main">
+              <a14:hiddenEffects xmlns:a14="http://schemas.microsoft.com/office/drawing/2010/main" xmlns="">
                 <a:effectLst>
                   <a:outerShdw blurRad="63500" dist="38099" dir="2700000" algn="ctr" rotWithShape="0">
                     <a:schemeClr val="bg2">
@@ -13180,14 +13227,14 @@
           <a:effectLst/>
           <a:extLst>
             <a:ext uri="{909E8E84-426E-40dd-AFC4-6F175D3DCCD1}">
-              <a14:hiddenFill xmlns="" xmlns:a14="http://schemas.microsoft.com/office/drawing/2010/main">
+              <a14:hiddenFill xmlns:a14="http://schemas.microsoft.com/office/drawing/2010/main" xmlns="">
                 <a:solidFill>
                   <a:schemeClr val="accent1"/>
                 </a:solidFill>
               </a14:hiddenFill>
             </a:ext>
             <a:ext uri="{91240B29-F687-4f45-9708-019B960494DF}">
-              <a14:hiddenLine xmlns="" xmlns:a14="http://schemas.microsoft.com/office/drawing/2010/main" w="9525">
+              <a14:hiddenLine xmlns:a14="http://schemas.microsoft.com/office/drawing/2010/main" xmlns="" w="9525">
                 <a:solidFill>
                   <a:schemeClr val="tx1"/>
                 </a:solidFill>
@@ -13197,7 +13244,7 @@
               </a14:hiddenLine>
             </a:ext>
             <a:ext uri="{AF507438-7753-43e0-B8FC-AC1667EBCBE1}">
-              <a14:hiddenEffects xmlns="" xmlns:a14="http://schemas.microsoft.com/office/drawing/2010/main">
+              <a14:hiddenEffects xmlns:a14="http://schemas.microsoft.com/office/drawing/2010/main" xmlns="">
                 <a:effectLst>
                   <a:outerShdw blurRad="63500" dist="38099" dir="2700000" algn="ctr" rotWithShape="0">
                     <a:schemeClr val="bg2">
@@ -13683,14 +13730,14 @@
           <a:effectLst/>
           <a:extLst>
             <a:ext uri="{909E8E84-426E-40dd-AFC4-6F175D3DCCD1}">
-              <a14:hiddenFill xmlns="" xmlns:a14="http://schemas.microsoft.com/office/drawing/2010/main">
+              <a14:hiddenFill xmlns:a14="http://schemas.microsoft.com/office/drawing/2010/main" xmlns="">
                 <a:solidFill>
                   <a:schemeClr val="accent1"/>
                 </a:solidFill>
               </a14:hiddenFill>
             </a:ext>
             <a:ext uri="{91240B29-F687-4f45-9708-019B960494DF}">
-              <a14:hiddenLine xmlns="" xmlns:a14="http://schemas.microsoft.com/office/drawing/2010/main" w="9525">
+              <a14:hiddenLine xmlns:a14="http://schemas.microsoft.com/office/drawing/2010/main" xmlns="" w="9525">
                 <a:solidFill>
                   <a:schemeClr val="tx1"/>
                 </a:solidFill>
@@ -13700,7 +13747,7 @@
               </a14:hiddenLine>
             </a:ext>
             <a:ext uri="{AF507438-7753-43e0-B8FC-AC1667EBCBE1}">
-              <a14:hiddenEffects xmlns="" xmlns:a14="http://schemas.microsoft.com/office/drawing/2010/main">
+              <a14:hiddenEffects xmlns:a14="http://schemas.microsoft.com/office/drawing/2010/main" xmlns="">
                 <a:effectLst>
                   <a:outerShdw blurRad="63500" dist="38099" dir="2700000" algn="ctr" rotWithShape="0">
                     <a:schemeClr val="bg2">
@@ -25681,7 +25728,7 @@
                 <a:latin typeface="Arial" panose="020B0604020202020204" pitchFamily="34" charset="0"/>
                 <a:cs typeface="Arial" panose="020B0604020202020204" pitchFamily="34" charset="0"/>
               </a:rPr>
-              <a:t>Going through R code</a:t>
+              <a:t>Go through R code</a:t>
             </a:r>
           </a:p>
         </p:txBody>
@@ -30146,14 +30193,14 @@
           </a:ln>
           <a:extLst>
             <a:ext uri="{909E8E84-426E-40dd-AFC4-6F175D3DCCD1}">
-              <a14:hiddenFill xmlns:a14="http://schemas.microsoft.com/office/drawing/2010/main" xmlns="">
+              <a14:hiddenFill xmlns="" xmlns:a14="http://schemas.microsoft.com/office/drawing/2010/main">
                 <a:solidFill>
                   <a:srgbClr val="FFFFFF"/>
                 </a:solidFill>
               </a14:hiddenFill>
             </a:ext>
             <a:ext uri="{91240B29-F687-4f45-9708-019B960494DF}">
-              <a14:hiddenLine xmlns:a14="http://schemas.microsoft.com/office/drawing/2010/main" xmlns="" w="9525">
+              <a14:hiddenLine xmlns="" xmlns:a14="http://schemas.microsoft.com/office/drawing/2010/main" w="9525">
                 <a:solidFill>
                   <a:srgbClr val="000000"/>
                 </a:solidFill>
@@ -30198,14 +30245,14 @@
           </a:ln>
           <a:extLst>
             <a:ext uri="{909E8E84-426E-40dd-AFC4-6F175D3DCCD1}">
-              <a14:hiddenFill xmlns:a14="http://schemas.microsoft.com/office/drawing/2010/main" xmlns="">
+              <a14:hiddenFill xmlns="" xmlns:a14="http://schemas.microsoft.com/office/drawing/2010/main">
                 <a:solidFill>
                   <a:srgbClr val="FFFFFF"/>
                 </a:solidFill>
               </a14:hiddenFill>
             </a:ext>
             <a:ext uri="{91240B29-F687-4f45-9708-019B960494DF}">
-              <a14:hiddenLine xmlns:a14="http://schemas.microsoft.com/office/drawing/2010/main" xmlns="" w="9525">
+              <a14:hiddenLine xmlns="" xmlns:a14="http://schemas.microsoft.com/office/drawing/2010/main" w="9525">
                 <a:solidFill>
                   <a:srgbClr val="000000"/>
                 </a:solidFill>

</xml_diff>